<commit_message>
slides10w,f 11w, edits on counting versions
</commit_message>
<xml_diff>
--- a/restricted/slides10f.pptx
+++ b/restricted/slides10f.pptx
@@ -3599,11 +3599,7 @@
             </a:r>
             <a:r>
               <a:rPr lang="en-US" dirty="0" smtClean="0"/>
-              <a:t> </a:t>
-            </a:r>
-            <a:r>
-              <a:rPr lang="en-US" dirty="0" smtClean="0"/>
-              <a:t>10F.</a:t>
+              <a:t> 10F.</a:t>
             </a:r>
             <a:fld id="{079D37AF-99FA-4D01-9518-1979F7715D44}" type="slidenum">
               <a:rPr lang="en-US" smtClean="0"/>
@@ -3667,52 +3663,7 @@
                 <a:uFillTx/>
                 <a:latin typeface="Comic Sans MS" pitchFamily="66" charset="0"/>
               </a:rPr>
-              <a:t>Albert R </a:t>
-            </a:r>
-            <a:r>
-              <a:rPr kumimoji="0" lang="en-US" sz="1200" b="0" i="0" u="none" strike="noStrike" kern="1200" cap="none" spc="0" normalizeH="0" baseline="0" noProof="0" dirty="0" smtClean="0">
-                <a:ln>
-                  <a:noFill/>
-                </a:ln>
-                <a:solidFill>
-                  <a:schemeClr val="tx1"/>
-                </a:solidFill>
-                <a:effectLst/>
-                <a:uLnTx/>
-                <a:uFillTx/>
-                <a:latin typeface="Comic Sans MS" pitchFamily="66" charset="0"/>
-              </a:rPr>
-              <a:t>Meyer,                  April </a:t>
-            </a:r>
-            <a:r>
-              <a:rPr kumimoji="0" lang="en-US" sz="1200" b="0" i="0" u="none" strike="noStrike" kern="1200" cap="none" spc="0" normalizeH="0" baseline="0" noProof="0" dirty="0" smtClean="0">
-                <a:ln>
-                  <a:noFill/>
-                </a:ln>
-                <a:solidFill>
-                  <a:schemeClr val="tx1"/>
-                </a:solidFill>
-                <a:effectLst/>
-                <a:uLnTx/>
-                <a:uFillTx/>
-                <a:latin typeface="Comic Sans MS" pitchFamily="66" charset="0"/>
-              </a:rPr>
-              <a:t>16, </a:t>
-            </a:r>
-            <a:r>
-              <a:rPr kumimoji="0" lang="en-US" sz="1200" b="0" i="0" u="none" strike="noStrike" kern="1200" cap="none" spc="0" normalizeH="0" baseline="0" noProof="0" dirty="0" smtClean="0">
-                <a:ln>
-                  <a:noFill/>
-                </a:ln>
-                <a:solidFill>
-                  <a:schemeClr val="tx1"/>
-                </a:solidFill>
-                <a:effectLst/>
-                <a:uLnTx/>
-                <a:uFillTx/>
-                <a:latin typeface="Comic Sans MS" pitchFamily="66" charset="0"/>
-              </a:rPr>
-              <a:t>2010</a:t>
+              <a:t>Albert R Meyer,                  April 16, 2010</a:t>
             </a:r>
             <a:endParaRPr kumimoji="0" lang="en-US" sz="1200" b="0" i="0" u="none" strike="noStrike" kern="1200" cap="none" spc="0" normalizeH="0" baseline="0" noProof="0" dirty="0">
               <a:ln>
@@ -5426,9 +5377,6 @@
               </a:rPr>
               <a:t>etc.</a:t>
             </a:r>
-            <a:endParaRPr lang="en-US" sz="4400" dirty="0" smtClean="0">
-              <a:latin typeface="Comic Sans MS" pitchFamily="66" charset="0"/>
-            </a:endParaRPr>
           </a:p>
         </p:txBody>
       </p:sp>
@@ -7497,13 +7445,7 @@
               <a:rPr lang="en-US" sz="4400" dirty="0" smtClean="0">
                 <a:latin typeface="Comic Sans MS" pitchFamily="66" charset="0"/>
               </a:rPr>
-              <a:t>  </a:t>
-            </a:r>
-            <a:r>
-              <a:rPr lang="en-US" sz="4400" dirty="0" smtClean="0">
-                <a:latin typeface="Comic Sans MS" pitchFamily="66" charset="0"/>
-              </a:rPr>
-              <a:t>   </a:t>
+              <a:t>     </a:t>
             </a:r>
             <a:r>
               <a:rPr lang="en-US" sz="4000" dirty="0" smtClean="0">
@@ -9965,13 +9907,7 @@
               <a:rPr lang="en-US" sz="4400" dirty="0" smtClean="0">
                 <a:latin typeface="Comic Sans MS" pitchFamily="66" charset="0"/>
               </a:rPr>
-              <a:t>  </a:t>
-            </a:r>
-            <a:r>
-              <a:rPr lang="en-US" sz="4400" dirty="0" smtClean="0">
-                <a:latin typeface="Comic Sans MS" pitchFamily="66" charset="0"/>
-              </a:rPr>
-              <a:t>    </a:t>
+              <a:t>      </a:t>
             </a:r>
             <a:r>
               <a:rPr lang="en-US" sz="4000" dirty="0" smtClean="0">
@@ -10983,13 +10919,7 @@
               <a:rPr lang="en-US" sz="4400" dirty="0" smtClean="0">
                 <a:latin typeface="Comic Sans MS" pitchFamily="66" charset="0"/>
               </a:rPr>
-              <a:t>    </a:t>
-            </a:r>
-            <a:r>
-              <a:rPr lang="en-US" sz="4400" dirty="0" smtClean="0">
-                <a:latin typeface="Comic Sans MS" pitchFamily="66" charset="0"/>
-              </a:rPr>
-              <a:t>    </a:t>
+              <a:t>        </a:t>
             </a:r>
             <a:r>
               <a:rPr lang="en-US" sz="4000" dirty="0" smtClean="0">
@@ -11976,13 +11906,7 @@
               <a:rPr lang="en-US" sz="4400" dirty="0" smtClean="0">
                 <a:latin typeface="Comic Sans MS" pitchFamily="66" charset="0"/>
               </a:rPr>
-              <a:t>   </a:t>
-            </a:r>
-            <a:r>
-              <a:rPr lang="en-US" sz="4400" dirty="0" smtClean="0">
-                <a:latin typeface="Comic Sans MS" pitchFamily="66" charset="0"/>
-              </a:rPr>
-              <a:t>   </a:t>
+              <a:t>      </a:t>
             </a:r>
             <a:r>
               <a:rPr lang="en-US" sz="4000" dirty="0" smtClean="0">
@@ -14375,7 +14299,7 @@
 </file>
 
 <file path=ppt/slides/slide20.xml><?xml version="1.0" encoding="utf-8"?>
-<p:sld xmlns:a="http://schemas.openxmlformats.org/drawingml/2006/main" xmlns:r="http://schemas.openxmlformats.org/officeDocument/2006/relationships" xmlns:mc="http://schemas.openxmlformats.org/markup-compatibility/2006" xmlns:mv="urn:schemas-microsoft-com:mac:vml" xmlns:p="http://schemas.openxmlformats.org/presentationml/2006/main" mc:Ignorable="mv" mc:PreserveAttributes="mv:*">
+<p:sld xmlns:a="http://schemas.openxmlformats.org/drawingml/2006/main" xmlns:r="http://schemas.openxmlformats.org/officeDocument/2006/relationships" xmlns:mc="http://schemas.openxmlformats.org/markup-compatibility/2006" xmlns:mv="urn:schemas-microsoft-com:mac:vml" xmlns:p="http://schemas.openxmlformats.org/presentationml/2006/main" mc:Ignorable="mv" mc:PreserveAttributes="mv:*" show="0">
   <p:cSld>
     <p:spTree>
       <p:nvGrpSpPr>
@@ -15749,7 +15673,7 @@
 </file>
 
 <file path=ppt/slides/slide21.xml><?xml version="1.0" encoding="utf-8"?>
-<p:sld xmlns:a="http://schemas.openxmlformats.org/drawingml/2006/main" xmlns:r="http://schemas.openxmlformats.org/officeDocument/2006/relationships" xmlns:mc="http://schemas.openxmlformats.org/markup-compatibility/2006" xmlns:mv="urn:schemas-microsoft-com:mac:vml" xmlns:p="http://schemas.openxmlformats.org/presentationml/2006/main" mc:Ignorable="mv" mc:PreserveAttributes="mv:*">
+<p:sld xmlns:a="http://schemas.openxmlformats.org/drawingml/2006/main" xmlns:r="http://schemas.openxmlformats.org/officeDocument/2006/relationships" xmlns:mc="http://schemas.openxmlformats.org/markup-compatibility/2006" xmlns:mv="urn:schemas-microsoft-com:mac:vml" xmlns:p="http://schemas.openxmlformats.org/presentationml/2006/main" mc:Ignorable="mv" mc:PreserveAttributes="mv:*" show="0">
   <p:cSld>
     <p:spTree>
       <p:nvGrpSpPr>
@@ -16438,13 +16362,7 @@
               <a:rPr lang="en-US" sz="9600" dirty="0" smtClean="0">
                 <a:latin typeface="Comic Sans MS" pitchFamily="66" charset="0"/>
               </a:rPr>
-              <a:t>1</a:t>
-            </a:r>
-            <a:r>
-              <a:rPr lang="en-US" sz="9600" dirty="0" smtClean="0">
-                <a:latin typeface="Comic Sans MS" pitchFamily="66" charset="0"/>
-              </a:rPr>
-              <a:t>—4</a:t>
+              <a:t>1—4</a:t>
             </a:r>
           </a:p>
         </p:txBody>

</xml_diff>

<commit_message>
slides10f typo on last slide
</commit_message>
<xml_diff>
--- a/restricted/slides10f.pptx
+++ b/restricted/slides10f.pptx
@@ -16359,11 +16359,20 @@
               </a:spcBef>
             </a:pPr>
             <a:r>
-              <a:rPr lang="en-US" sz="9600" dirty="0" smtClean="0">
-                <a:latin typeface="Comic Sans MS" pitchFamily="66" charset="0"/>
-              </a:rPr>
-              <a:t>1—4</a:t>
-            </a:r>
+              <a:rPr lang="en-US" sz="9600" smtClean="0">
+                <a:latin typeface="Comic Sans MS" pitchFamily="66" charset="0"/>
+              </a:rPr>
+              <a:t>1</a:t>
+            </a:r>
+            <a:r>
+              <a:rPr lang="en-US" sz="9600" smtClean="0">
+                <a:latin typeface="Comic Sans MS" pitchFamily="66" charset="0"/>
+              </a:rPr>
+              <a:t>—3</a:t>
+            </a:r>
+            <a:endParaRPr lang="en-US" sz="9600" dirty="0" smtClean="0">
+              <a:latin typeface="Comic Sans MS" pitchFamily="66" charset="0"/>
+            </a:endParaRPr>
           </a:p>
         </p:txBody>
       </p:sp>

</xml_diff>